<commit_message>
req logic gap fertig beschrieben
</commit_message>
<xml_diff>
--- a/resources/images/requirements-logic-gap.pptx
+++ b/resources/images/requirements-logic-gap.pptx
@@ -7,6 +7,7 @@
   <p:sldIdLst>
     <p:sldId id="258" r:id="rId2"/>
     <p:sldId id="259" r:id="rId3"/>
+    <p:sldId id="260" r:id="rId4"/>
   </p:sldIdLst>
   <p:sldSz cx="12192000" cy="6858000"/>
   <p:notesSz cx="6858000" cy="9144000"/>
@@ -105,6 +106,11 @@
       </a:defRPr>
     </a:lvl9pPr>
   </p:defaultTextStyle>
+  <p:extLst>
+    <p:ext uri="{EFAFB233-063F-42B5-8137-9DF3F51BA10A}">
+      <p15:sldGuideLst xmlns:p15="http://schemas.microsoft.com/office/powerpoint/2012/main"/>
+    </p:ext>
+  </p:extLst>
 </p:presentation>
 </file>
 
@@ -239,7 +245,7 @@
           <a:p>
             <a:fld id="{5E1D334C-65E9-854B-A321-61F0A685BE5D}" type="datetimeFigureOut">
               <a:rPr lang="de-DE" smtClean="0"/>
-              <a:t>09.01.16</a:t>
+              <a:t>10.01.16</a:t>
             </a:fld>
             <a:endParaRPr lang="de-DE"/>
           </a:p>
@@ -409,7 +415,7 @@
           <a:p>
             <a:fld id="{5E1D334C-65E9-854B-A321-61F0A685BE5D}" type="datetimeFigureOut">
               <a:rPr lang="de-DE" smtClean="0"/>
-              <a:t>09.01.16</a:t>
+              <a:t>10.01.16</a:t>
             </a:fld>
             <a:endParaRPr lang="de-DE"/>
           </a:p>
@@ -589,7 +595,7 @@
           <a:p>
             <a:fld id="{5E1D334C-65E9-854B-A321-61F0A685BE5D}" type="datetimeFigureOut">
               <a:rPr lang="de-DE" smtClean="0"/>
-              <a:t>09.01.16</a:t>
+              <a:t>10.01.16</a:t>
             </a:fld>
             <a:endParaRPr lang="de-DE"/>
           </a:p>
@@ -759,7 +765,7 @@
           <a:p>
             <a:fld id="{5E1D334C-65E9-854B-A321-61F0A685BE5D}" type="datetimeFigureOut">
               <a:rPr lang="de-DE" smtClean="0"/>
-              <a:t>09.01.16</a:t>
+              <a:t>10.01.16</a:t>
             </a:fld>
             <a:endParaRPr lang="de-DE"/>
           </a:p>
@@ -1005,7 +1011,7 @@
           <a:p>
             <a:fld id="{5E1D334C-65E9-854B-A321-61F0A685BE5D}" type="datetimeFigureOut">
               <a:rPr lang="de-DE" smtClean="0"/>
-              <a:t>09.01.16</a:t>
+              <a:t>10.01.16</a:t>
             </a:fld>
             <a:endParaRPr lang="de-DE"/>
           </a:p>
@@ -1237,7 +1243,7 @@
           <a:p>
             <a:fld id="{5E1D334C-65E9-854B-A321-61F0A685BE5D}" type="datetimeFigureOut">
               <a:rPr lang="de-DE" smtClean="0"/>
-              <a:t>09.01.16</a:t>
+              <a:t>10.01.16</a:t>
             </a:fld>
             <a:endParaRPr lang="de-DE"/>
           </a:p>
@@ -1604,7 +1610,7 @@
           <a:p>
             <a:fld id="{5E1D334C-65E9-854B-A321-61F0A685BE5D}" type="datetimeFigureOut">
               <a:rPr lang="de-DE" smtClean="0"/>
-              <a:t>09.01.16</a:t>
+              <a:t>10.01.16</a:t>
             </a:fld>
             <a:endParaRPr lang="de-DE"/>
           </a:p>
@@ -1722,7 +1728,7 @@
           <a:p>
             <a:fld id="{5E1D334C-65E9-854B-A321-61F0A685BE5D}" type="datetimeFigureOut">
               <a:rPr lang="de-DE" smtClean="0"/>
-              <a:t>09.01.16</a:t>
+              <a:t>10.01.16</a:t>
             </a:fld>
             <a:endParaRPr lang="de-DE"/>
           </a:p>
@@ -1817,7 +1823,7 @@
           <a:p>
             <a:fld id="{5E1D334C-65E9-854B-A321-61F0A685BE5D}" type="datetimeFigureOut">
               <a:rPr lang="de-DE" smtClean="0"/>
-              <a:t>09.01.16</a:t>
+              <a:t>10.01.16</a:t>
             </a:fld>
             <a:endParaRPr lang="de-DE"/>
           </a:p>
@@ -2094,7 +2100,7 @@
           <a:p>
             <a:fld id="{5E1D334C-65E9-854B-A321-61F0A685BE5D}" type="datetimeFigureOut">
               <a:rPr lang="de-DE" smtClean="0"/>
-              <a:t>09.01.16</a:t>
+              <a:t>10.01.16</a:t>
             </a:fld>
             <a:endParaRPr lang="de-DE"/>
           </a:p>
@@ -2347,7 +2353,7 @@
           <a:p>
             <a:fld id="{5E1D334C-65E9-854B-A321-61F0A685BE5D}" type="datetimeFigureOut">
               <a:rPr lang="de-DE" smtClean="0"/>
-              <a:t>09.01.16</a:t>
+              <a:t>10.01.16</a:t>
             </a:fld>
             <a:endParaRPr lang="de-DE"/>
           </a:p>
@@ -2560,7 +2566,7 @@
           <a:p>
             <a:fld id="{5E1D334C-65E9-854B-A321-61F0A685BE5D}" type="datetimeFigureOut">
               <a:rPr lang="de-DE" smtClean="0"/>
-              <a:t>09.01.16</a:t>
+              <a:t>10.01.16</a:t>
             </a:fld>
             <a:endParaRPr lang="de-DE"/>
           </a:p>
@@ -3522,6 +3528,205 @@
 </p:sld>
 </file>
 
+<file path=ppt/slides/slide3.xml><?xml version="1.0" encoding="utf-8"?>
+<p:sld xmlns:a="http://schemas.openxmlformats.org/drawingml/2006/main" xmlns:r="http://schemas.openxmlformats.org/officeDocument/2006/relationships" xmlns:p="http://schemas.openxmlformats.org/presentationml/2006/main">
+  <p:cSld>
+    <p:spTree>
+      <p:nvGrpSpPr>
+        <p:cNvPr id="1" name=""/>
+        <p:cNvGrpSpPr/>
+        <p:nvPr/>
+      </p:nvGrpSpPr>
+      <p:grpSpPr>
+        <a:xfrm>
+          <a:off x="0" y="0"/>
+          <a:ext cx="0" cy="0"/>
+          <a:chOff x="0" y="0"/>
+          <a:chExt cx="0" cy="0"/>
+        </a:xfrm>
+      </p:grpSpPr>
+      <p:sp>
+        <p:nvSpPr>
+          <p:cNvPr id="2" name="Rechteck 1"/>
+          <p:cNvSpPr/>
+          <p:nvPr/>
+        </p:nvSpPr>
+        <p:spPr>
+          <a:xfrm>
+            <a:off x="4592320" y="2600960"/>
+            <a:ext cx="3027680" cy="650240"/>
+          </a:xfrm>
+          <a:prstGeom prst="rect">
+            <a:avLst/>
+          </a:prstGeom>
+        </p:spPr>
+        <p:style>
+          <a:lnRef idx="0">
+            <a:schemeClr val="accent2"/>
+          </a:lnRef>
+          <a:fillRef idx="3">
+            <a:schemeClr val="accent2"/>
+          </a:fillRef>
+          <a:effectRef idx="3">
+            <a:schemeClr val="accent2"/>
+          </a:effectRef>
+          <a:fontRef idx="minor">
+            <a:schemeClr val="lt1"/>
+          </a:fontRef>
+        </p:style>
+        <p:txBody>
+          <a:bodyPr rtlCol="0" anchor="ctr"/>
+          <a:lstStyle/>
+          <a:p>
+            <a:pPr algn="ctr"/>
+            <a:r>
+              <a:rPr lang="de-DE" dirty="0" err="1" smtClean="0"/>
+              <a:t>Requirements</a:t>
+            </a:r>
+            <a:endParaRPr lang="de-DE" dirty="0"/>
+          </a:p>
+        </p:txBody>
+      </p:sp>
+      <p:sp>
+        <p:nvSpPr>
+          <p:cNvPr id="3" name="Rechteck 2"/>
+          <p:cNvSpPr/>
+          <p:nvPr/>
+        </p:nvSpPr>
+        <p:spPr>
+          <a:xfrm>
+            <a:off x="4592320" y="5384800"/>
+            <a:ext cx="3027680" cy="650240"/>
+          </a:xfrm>
+          <a:prstGeom prst="rect">
+            <a:avLst/>
+          </a:prstGeom>
+        </p:spPr>
+        <p:style>
+          <a:lnRef idx="0">
+            <a:schemeClr val="accent6"/>
+          </a:lnRef>
+          <a:fillRef idx="3">
+            <a:schemeClr val="accent6"/>
+          </a:fillRef>
+          <a:effectRef idx="3">
+            <a:schemeClr val="accent6"/>
+          </a:effectRef>
+          <a:fontRef idx="minor">
+            <a:schemeClr val="lt1"/>
+          </a:fontRef>
+        </p:style>
+        <p:txBody>
+          <a:bodyPr rtlCol="0" anchor="ctr"/>
+          <a:lstStyle/>
+          <a:p>
+            <a:pPr algn="ctr"/>
+            <a:r>
+              <a:rPr lang="de-DE" dirty="0" err="1" smtClean="0"/>
+              <a:t>Logic</a:t>
+            </a:r>
+            <a:endParaRPr lang="de-DE" dirty="0"/>
+          </a:p>
+        </p:txBody>
+      </p:sp>
+      <p:pic>
+        <p:nvPicPr>
+          <p:cNvPr id="4" name="Bild 3"/>
+          <p:cNvPicPr>
+            <a:picLocks noChangeAspect="1"/>
+          </p:cNvPicPr>
+          <p:nvPr/>
+        </p:nvPicPr>
+        <p:blipFill>
+          <a:blip r:embed="rId2"/>
+          <a:stretch>
+            <a:fillRect/>
+          </a:stretch>
+        </p:blipFill>
+        <p:spPr>
+          <a:xfrm rot="969045">
+            <a:off x="5120641" y="3708400"/>
+            <a:ext cx="1120523" cy="1046480"/>
+          </a:xfrm>
+          <a:prstGeom prst="rect">
+            <a:avLst/>
+          </a:prstGeom>
+        </p:spPr>
+      </p:pic>
+      <p:sp>
+        <p:nvSpPr>
+          <p:cNvPr id="5" name="Legende mit Linie (1) 4"/>
+          <p:cNvSpPr/>
+          <p:nvPr/>
+        </p:nvSpPr>
+        <p:spPr>
+          <a:xfrm>
+            <a:off x="7620000" y="3865880"/>
+            <a:ext cx="1981200" cy="365760"/>
+          </a:xfrm>
+          <a:prstGeom prst="borderCallout1">
+            <a:avLst/>
+          </a:prstGeom>
+        </p:spPr>
+        <p:style>
+          <a:lnRef idx="2">
+            <a:schemeClr val="accent4"/>
+          </a:lnRef>
+          <a:fillRef idx="1">
+            <a:schemeClr val="lt1"/>
+          </a:fillRef>
+          <a:effectRef idx="0">
+            <a:schemeClr val="accent4"/>
+          </a:effectRef>
+          <a:fontRef idx="minor">
+            <a:schemeClr val="dk1"/>
+          </a:fontRef>
+        </p:style>
+        <p:txBody>
+          <a:bodyPr rtlCol="0" anchor="ctr"/>
+          <a:lstStyle/>
+          <a:p>
+            <a:pPr algn="ctr"/>
+            <a:r>
+              <a:rPr lang="de-DE" dirty="0" err="1" smtClean="0"/>
+              <a:t>Mind</a:t>
+            </a:r>
+            <a:r>
+              <a:rPr lang="de-DE" dirty="0" smtClean="0"/>
+              <a:t> </a:t>
+            </a:r>
+            <a:r>
+              <a:rPr lang="de-DE" dirty="0" err="1" smtClean="0"/>
+              <a:t>the</a:t>
+            </a:r>
+            <a:r>
+              <a:rPr lang="de-DE" dirty="0" smtClean="0"/>
+              <a:t> Gap!</a:t>
+            </a:r>
+            <a:endParaRPr lang="de-DE" dirty="0"/>
+          </a:p>
+        </p:txBody>
+      </p:sp>
+    </p:spTree>
+    <p:extLst>
+      <p:ext uri="{BB962C8B-B14F-4D97-AF65-F5344CB8AC3E}">
+        <p14:creationId xmlns:p14="http://schemas.microsoft.com/office/powerpoint/2010/main" val="1681086265"/>
+      </p:ext>
+    </p:extLst>
+  </p:cSld>
+  <p:clrMapOvr>
+    <a:masterClrMapping/>
+  </p:clrMapOvr>
+  <p:timing>
+    <p:tnLst>
+      <p:par>
+        <p:cTn id="1" dur="indefinite" restart="never" nodeType="tmRoot"/>
+      </p:par>
+    </p:tnLst>
+  </p:timing>
+</p:sld>
+</file>
+
 <file path=ppt/theme/theme1.xml><?xml version="1.0" encoding="utf-8"?>
 <a:theme xmlns:a="http://schemas.openxmlformats.org/drawingml/2006/main" name="Office-Design">
   <a:themeElements>

</xml_diff>